<commit_message>
started breaking up sagehen_parameters notebook into separate files
</commit_message>
<xml_diff>
--- a/presentations/Niswonger/Intro_modflow_C.pptx
+++ b/presentations/Niswonger/Intro_modflow_C.pptx
@@ -523,7 +523,7 @@
               <a:pPr>
                 <a:defRPr/>
               </a:pPr>
-              <a:t>11/21/2018</a:t>
+              <a:t>11/23/2018</a:t>
             </a:fld>
             <a:endParaRPr lang="en-US"/>
           </a:p>
@@ -7424,9 +7424,7 @@
             <a:ext cx="7772400" cy="1143000"/>
           </a:xfrm>
           <a:ln>
-            <a:solidFill>
-              <a:schemeClr val="bg1"/>
-            </a:solidFill>
+            <a:noFill/>
           </a:ln>
         </p:spPr>
         <p:txBody>
@@ -7468,7 +7466,7 @@
           <a:noFill/>
           <a:ln w="28575">
             <a:solidFill>
-              <a:schemeClr val="tx1"/>
+              <a:schemeClr val="bg1"/>
             </a:solidFill>
             <a:miter lim="800000"/>
             <a:headEnd/>
@@ -7743,7 +7741,7 @@
           <a:noFill/>
           <a:ln w="38100">
             <a:solidFill>
-              <a:schemeClr val="tx1"/>
+              <a:schemeClr val="bg1"/>
             </a:solidFill>
             <a:round/>
             <a:headEnd/>
@@ -8148,7 +8146,7 @@
           <a:noFill/>
           <a:ln w="38100">
             <a:solidFill>
-              <a:schemeClr val="tx1"/>
+              <a:schemeClr val="bg1"/>
             </a:solidFill>
             <a:round/>
             <a:headEnd/>
@@ -8256,7 +8254,7 @@
           <a:noFill/>
           <a:ln w="38100">
             <a:solidFill>
-              <a:schemeClr val="tx1"/>
+              <a:schemeClr val="bg1"/>
             </a:solidFill>
             <a:round/>
             <a:headEnd/>
@@ -8299,7 +8297,7 @@
           <a:noFill/>
           <a:ln w="38100">
             <a:solidFill>
-              <a:schemeClr val="tx1"/>
+              <a:schemeClr val="bg1"/>
             </a:solidFill>
             <a:round/>
             <a:headEnd/>
@@ -8835,7 +8833,7 @@
           <a:noFill/>
           <a:ln w="28575">
             <a:solidFill>
-              <a:schemeClr val="tx1"/>
+              <a:schemeClr val="bg1"/>
             </a:solidFill>
             <a:round/>
             <a:headEnd/>
@@ -9056,7 +9054,11 @@
           <a:p>
             <a:pPr eaLnBrk="1" hangingPunct="1"/>
             <a:r>
-              <a:rPr lang="en-US" altLang="en-US"/>
+              <a:rPr lang="en-US" altLang="en-US" dirty="0">
+                <a:solidFill>
+                  <a:schemeClr val="bg1"/>
+                </a:solidFill>
+              </a:rPr>
               <a:t>t</a:t>
             </a:r>
           </a:p>
@@ -9207,22 +9209,35 @@
           <a:p>
             <a:pPr eaLnBrk="1" hangingPunct="1"/>
             <a:r>
-              <a:rPr lang="en-US" altLang="en-US"/>
+              <a:rPr lang="en-US" altLang="en-US" dirty="0">
+                <a:solidFill>
+                  <a:schemeClr val="bg1"/>
+                </a:solidFill>
+              </a:rPr>
               <a:t>t+</a:t>
             </a:r>
             <a:r>
-              <a:rPr lang="el-GR" altLang="en-US">
+              <a:rPr lang="el-GR" altLang="en-US" dirty="0">
+                <a:solidFill>
+                  <a:schemeClr val="bg1"/>
+                </a:solidFill>
                 <a:cs typeface="Times New Roman" panose="02020603050405020304" pitchFamily="18" charset="0"/>
               </a:rPr>
               <a:t>Δ</a:t>
             </a:r>
             <a:r>
-              <a:rPr lang="en-US" altLang="en-US">
+              <a:rPr lang="en-US" altLang="en-US" dirty="0">
+                <a:solidFill>
+                  <a:schemeClr val="bg1"/>
+                </a:solidFill>
                 <a:cs typeface="Times New Roman" panose="02020603050405020304" pitchFamily="18" charset="0"/>
               </a:rPr>
               <a:t>t</a:t>
             </a:r>
-            <a:endParaRPr lang="el-GR" altLang="en-US">
+            <a:endParaRPr lang="el-GR" altLang="en-US" dirty="0">
+              <a:solidFill>
+                <a:schemeClr val="bg1"/>
+              </a:solidFill>
               <a:cs typeface="Times New Roman" panose="02020603050405020304" pitchFamily="18" charset="0"/>
             </a:endParaRPr>
           </a:p>
@@ -9435,7 +9450,7 @@
           <a:noFill/>
           <a:ln w="15875">
             <a:solidFill>
-              <a:schemeClr val="tx2"/>
+              <a:schemeClr val="bg1"/>
             </a:solidFill>
             <a:round/>
             <a:headEnd/>
@@ -9476,7 +9491,7 @@
           <a:noFill/>
           <a:ln w="15875">
             <a:solidFill>
-              <a:schemeClr val="tx2"/>
+              <a:schemeClr val="bg1"/>
             </a:solidFill>
             <a:round/>
             <a:headEnd/>
@@ -9549,29 +9564,13 @@
               <a:defRPr/>
             </a:pPr>
             <a:r>
-              <a:rPr lang="en-US" sz="4000"/>
+              <a:rPr lang="en-US" sz="4000" dirty="0">
+                <a:solidFill>
+                  <a:schemeClr val="bg1"/>
+                </a:solidFill>
+              </a:rPr>
               <a:t>UZF1 Compared to Observed Field Data and Richard’s Equation</a:t>
             </a:r>
-          </a:p>
-        </p:txBody>
-      </p:sp>
-      <p:sp>
-        <p:nvSpPr>
-          <p:cNvPr id="35843" name="Rectangle 3"/>
-          <p:cNvSpPr>
-            <a:spLocks noGrp="1" noChangeArrowheads="1"/>
-          </p:cNvSpPr>
-          <p:nvPr>
-            <p:ph type="body" idx="1"/>
-          </p:nvPr>
-        </p:nvSpPr>
-        <p:spPr/>
-        <p:txBody>
-          <a:bodyPr/>
-          <a:lstStyle/>
-          <a:p>
-            <a:pPr eaLnBrk="1" hangingPunct="1"/>
-            <a:endParaRPr lang="en-US" altLang="en-US"/>
           </a:p>
         </p:txBody>
       </p:sp>
@@ -9832,8 +9831,28 @@
               <a:defRPr/>
             </a:pPr>
             <a:r>
-              <a:rPr lang="en-US" sz="4000"/>
-              <a:t>Comparison to Vauclin et al. (1979) Laboratory Experiment</a:t>
+              <a:rPr lang="en-US" sz="4000" dirty="0">
+                <a:solidFill>
+                  <a:schemeClr val="bg1"/>
+                </a:solidFill>
+              </a:rPr>
+              <a:t>Comparison to </a:t>
+            </a:r>
+            <a:r>
+              <a:rPr lang="en-US" sz="4000" dirty="0" err="1">
+                <a:solidFill>
+                  <a:schemeClr val="bg1"/>
+                </a:solidFill>
+              </a:rPr>
+              <a:t>Vauclin</a:t>
+            </a:r>
+            <a:r>
+              <a:rPr lang="en-US" sz="4000" dirty="0">
+                <a:solidFill>
+                  <a:schemeClr val="bg1"/>
+                </a:solidFill>
+              </a:rPr>
+              <a:t> et al. (1979) Laboratory Experiment</a:t>
             </a:r>
           </a:p>
         </p:txBody>
@@ -9957,7 +9976,7 @@
         <p:spPr bwMode="auto">
           <a:xfrm>
             <a:off x="727075" y="2038350"/>
-            <a:ext cx="4251325" cy="519113"/>
+            <a:ext cx="3846566" cy="477054"/>
           </a:xfrm>
           <a:prstGeom prst="rect">
             <a:avLst/>
@@ -10091,7 +10110,11 @@
           <a:p>
             <a:pPr eaLnBrk="1" hangingPunct="1"/>
             <a:r>
-              <a:rPr lang="en-US" altLang="en-US"/>
+              <a:rPr lang="en-US" altLang="en-US" dirty="0">
+                <a:solidFill>
+                  <a:schemeClr val="bg1"/>
+                </a:solidFill>
+              </a:rPr>
               <a:t>Richards’ equation (Hydrus)</a:t>
             </a:r>
           </a:p>
@@ -10259,7 +10282,7 @@
         <p:spPr bwMode="auto">
           <a:xfrm>
             <a:off x="1031875" y="5876925"/>
-            <a:ext cx="7750175" cy="517525"/>
+            <a:ext cx="7750175" cy="523220"/>
           </a:xfrm>
           <a:prstGeom prst="rect">
             <a:avLst/>
@@ -10393,23 +10416,87 @@
           <a:p>
             <a:pPr eaLnBrk="1" hangingPunct="1"/>
             <a:r>
-              <a:rPr lang="en-US" altLang="en-US" sz="1400"/>
-              <a:t>From Twarakavi et al. (2008) 7 (2) Vadose Zone Journal</a:t>
+              <a:rPr lang="en-US" altLang="en-US" sz="1400" dirty="0">
+                <a:solidFill>
+                  <a:schemeClr val="bg1"/>
+                </a:solidFill>
+              </a:rPr>
+              <a:t>From </a:t>
+            </a:r>
+            <a:r>
+              <a:rPr lang="en-US" altLang="en-US" sz="1400" dirty="0" err="1">
+                <a:solidFill>
+                  <a:schemeClr val="bg1"/>
+                </a:solidFill>
+              </a:rPr>
+              <a:t>Twarakavi</a:t>
+            </a:r>
+            <a:r>
+              <a:rPr lang="en-US" altLang="en-US" sz="1400" dirty="0">
+                <a:solidFill>
+                  <a:schemeClr val="bg1"/>
+                </a:solidFill>
+              </a:rPr>
+              <a:t> et al. (2008) 7 (2) Vadose Zone Journal</a:t>
             </a:r>
           </a:p>
           <a:p>
             <a:pPr eaLnBrk="1" hangingPunct="1"/>
             <a:r>
-              <a:rPr lang="en-US" altLang="en-US" sz="1400"/>
+              <a:rPr lang="en-US" altLang="en-US" sz="1400" dirty="0">
+                <a:solidFill>
+                  <a:schemeClr val="bg1"/>
+                </a:solidFill>
+              </a:rPr>
               <a:t>Lab experiment:  </a:t>
             </a:r>
             <a:r>
-              <a:rPr lang="en-US" altLang="en-US" sz="1400" b="1"/>
+              <a:rPr lang="en-US" altLang="en-US" sz="1400" b="1" dirty="0" err="1">
+                <a:solidFill>
+                  <a:schemeClr val="bg1"/>
+                </a:solidFill>
+              </a:rPr>
               <a:t>Vauclin</a:t>
             </a:r>
             <a:r>
-              <a:rPr lang="en-US" altLang="en-US" sz="1400"/>
-              <a:t>, D Khanji, G Vachaud - Water Resources Research, 1979 </a:t>
+              <a:rPr lang="en-US" altLang="en-US" sz="1400" dirty="0">
+                <a:solidFill>
+                  <a:schemeClr val="bg1"/>
+                </a:solidFill>
+              </a:rPr>
+              <a:t>, D </a:t>
+            </a:r>
+            <a:r>
+              <a:rPr lang="en-US" altLang="en-US" sz="1400" dirty="0" err="1">
+                <a:solidFill>
+                  <a:schemeClr val="bg1"/>
+                </a:solidFill>
+              </a:rPr>
+              <a:t>Khanji</a:t>
+            </a:r>
+            <a:r>
+              <a:rPr lang="en-US" altLang="en-US" sz="1400" dirty="0">
+                <a:solidFill>
+                  <a:schemeClr val="bg1"/>
+                </a:solidFill>
+              </a:rPr>
+              <a:t>, G </a:t>
+            </a:r>
+            <a:r>
+              <a:rPr lang="en-US" altLang="en-US" sz="1400" dirty="0" err="1">
+                <a:solidFill>
+                  <a:schemeClr val="bg1"/>
+                </a:solidFill>
+              </a:rPr>
+              <a:t>Vachaud</a:t>
+            </a:r>
+            <a:r>
+              <a:rPr lang="en-US" altLang="en-US" sz="1400" dirty="0">
+                <a:solidFill>
+                  <a:schemeClr val="bg1"/>
+                </a:solidFill>
+              </a:rPr>
+              <a:t> - Water Resources Research, 1979 </a:t>
             </a:r>
           </a:p>
         </p:txBody>
@@ -14225,7 +14312,7 @@
           <a:graphicData uri="http://schemas.openxmlformats.org/presentationml/2006/ole">
             <mc:AlternateContent xmlns:mc="http://schemas.openxmlformats.org/markup-compatibility/2006">
               <mc:Choice xmlns:v="urn:schemas-microsoft-com:vml" Requires="v">
-                <p:oleObj spid="_x0000_s46115" name="Equation" r:id="rId4" imgW="1282700" imgH="393700" progId="Equation.3">
+                <p:oleObj spid="_x0000_s46121" name="Equation" r:id="rId4" imgW="1282700" imgH="393700" progId="Equation.3">
                   <p:embed/>
                 </p:oleObj>
               </mc:Choice>
@@ -14456,7 +14543,7 @@
           <a:graphicData uri="http://schemas.openxmlformats.org/presentationml/2006/ole">
             <mc:AlternateContent xmlns:mc="http://schemas.openxmlformats.org/markup-compatibility/2006">
               <mc:Choice xmlns:v="urn:schemas-microsoft-com:vml" Requires="v">
-                <p:oleObj spid="_x0000_s46116" name="Equation" r:id="rId6" imgW="1231366" imgH="393529" progId="Equation.3">
+                <p:oleObj spid="_x0000_s46122" name="Equation" r:id="rId6" imgW="1231366" imgH="393529" progId="Equation.3">
                   <p:embed/>
                 </p:oleObj>
               </mc:Choice>
@@ -14693,7 +14780,7 @@
           <a:graphicData uri="http://schemas.openxmlformats.org/presentationml/2006/ole">
             <mc:AlternateContent xmlns:mc="http://schemas.openxmlformats.org/markup-compatibility/2006">
               <mc:Choice xmlns:v="urn:schemas-microsoft-com:vml" Requires="v">
-                <p:oleObj spid="_x0000_s46117" name="Equation" r:id="rId8" imgW="1651000" imgH="787400" progId="Equation.3">
+                <p:oleObj spid="_x0000_s46123" name="Equation" r:id="rId8" imgW="1651000" imgH="787400" progId="Equation.3">
                   <p:embed/>
                 </p:oleObj>
               </mc:Choice>
@@ -17077,7 +17164,7 @@
           <a:graphicData uri="http://schemas.openxmlformats.org/presentationml/2006/ole">
             <mc:AlternateContent xmlns:mc="http://schemas.openxmlformats.org/markup-compatibility/2006">
               <mc:Choice xmlns:v="urn:schemas-microsoft-com:vml" Requires="v">
-                <p:oleObj spid="_x0000_s47161" name="Equation" r:id="rId5" imgW="1002865" imgH="609336" progId="Equation.3">
+                <p:oleObj spid="_x0000_s47171" name="Equation" r:id="rId5" imgW="1002865" imgH="609336" progId="Equation.3">
                   <p:embed/>
                 </p:oleObj>
               </mc:Choice>
@@ -17160,7 +17247,7 @@
           <a:graphicData uri="http://schemas.openxmlformats.org/presentationml/2006/ole">
             <mc:AlternateContent xmlns:mc="http://schemas.openxmlformats.org/markup-compatibility/2006">
               <mc:Choice xmlns:v="urn:schemas-microsoft-com:vml" Requires="v">
-                <p:oleObj spid="_x0000_s47162" name="Equation" r:id="rId7" imgW="762000" imgH="457200" progId="Equation.3">
+                <p:oleObj spid="_x0000_s47172" name="Equation" r:id="rId7" imgW="762000" imgH="457200" progId="Equation.3">
                   <p:embed/>
                 </p:oleObj>
               </mc:Choice>
@@ -17243,7 +17330,7 @@
           <a:graphicData uri="http://schemas.openxmlformats.org/presentationml/2006/ole">
             <mc:AlternateContent xmlns:mc="http://schemas.openxmlformats.org/markup-compatibility/2006">
               <mc:Choice xmlns:v="urn:schemas-microsoft-com:vml" Requires="v">
-                <p:oleObj spid="_x0000_s47163" name="Equation" r:id="rId9" imgW="1040948" imgH="609336" progId="Equation.3">
+                <p:oleObj spid="_x0000_s47173" name="Equation" r:id="rId9" imgW="1040948" imgH="609336" progId="Equation.3">
                   <p:embed/>
                 </p:oleObj>
               </mc:Choice>
@@ -17474,7 +17561,7 @@
           <a:graphicData uri="http://schemas.openxmlformats.org/presentationml/2006/ole">
             <mc:AlternateContent xmlns:mc="http://schemas.openxmlformats.org/markup-compatibility/2006">
               <mc:Choice xmlns:v="urn:schemas-microsoft-com:vml" Requires="v">
-                <p:oleObj spid="_x0000_s47164" name="Equation" r:id="rId11" imgW="545863" imgH="393529" progId="Equation.3">
+                <p:oleObj spid="_x0000_s47174" name="Equation" r:id="rId11" imgW="545863" imgH="393529" progId="Equation.3">
                   <p:embed/>
                 </p:oleObj>
               </mc:Choice>
@@ -17853,7 +17940,7 @@
           <a:graphicData uri="http://schemas.openxmlformats.org/presentationml/2006/ole">
             <mc:AlternateContent xmlns:mc="http://schemas.openxmlformats.org/markup-compatibility/2006">
               <mc:Choice xmlns:v="urn:schemas-microsoft-com:vml" Requires="v">
-                <p:oleObj spid="_x0000_s47165" name="Equation" r:id="rId13" imgW="1079500" imgH="419100" progId="Equation.3">
+                <p:oleObj spid="_x0000_s47175" name="Equation" r:id="rId13" imgW="1079500" imgH="419100" progId="Equation.3">
                   <p:embed/>
                 </p:oleObj>
               </mc:Choice>

</xml_diff>